<commit_message>
inserita parte sviluppi futuri
</commit_message>
<xml_diff>
--- a/tesi/presentazione/template laurea.pptx
+++ b/tesi/presentazione/template laurea.pptx
@@ -5,7 +5,7 @@
     <p:sldMasterId id="2147483648" r:id="rId1"/>
   </p:sldMasterIdLst>
   <p:notesMasterIdLst>
-    <p:notesMasterId r:id="rId13"/>
+    <p:notesMasterId r:id="rId14"/>
   </p:notesMasterIdLst>
   <p:sldIdLst>
     <p:sldId id="256" r:id="rId2"/>
@@ -18,7 +18,8 @@
     <p:sldId id="262" r:id="rId9"/>
     <p:sldId id="263" r:id="rId10"/>
     <p:sldId id="264" r:id="rId11"/>
-    <p:sldId id="265" r:id="rId12"/>
+    <p:sldId id="267" r:id="rId12"/>
+    <p:sldId id="265" r:id="rId13"/>
   </p:sldIdLst>
   <p:sldSz cx="12192000" cy="6858000"/>
   <p:notesSz cx="6858000" cy="9144000"/>
@@ -119,7 +120,7 @@
   </p:defaultTextStyle>
   <p:extLst>
     <p:ext uri="{EFAFB233-063F-42B5-8137-9DF3F51BA10A}">
-      <p15:sldGuideLst xmlns:p15="http://schemas.microsoft.com/office/powerpoint/2012/main"/>
+      <p15:sldGuideLst xmlns:p15="http://schemas.microsoft.com/office/powerpoint/2012/main" xmlns=""/>
     </p:ext>
   </p:extLst>
 </p:presentation>
@@ -207,7 +208,7 @@
           <a:p>
             <a:fld id="{B8FD74C9-97B2-40A2-A045-D98EF1CCDAB4}" type="datetimeFigureOut">
               <a:rPr lang="it-IT" smtClean="0"/>
-              <a:t>06/09/2015</a:t>
+              <a:t>09/09/2015</a:t>
             </a:fld>
             <a:endParaRPr lang="it-IT"/>
           </a:p>
@@ -881,6 +882,90 @@
     </p:spTree>
     <p:extLst>
       <p:ext uri="{BB962C8B-B14F-4D97-AF65-F5344CB8AC3E}">
+        <p14:creationId xmlns:p14="http://schemas.microsoft.com/office/powerpoint/2010/main" val="393520312"/>
+      </p:ext>
+    </p:extLst>
+  </p:cSld>
+  <p:clrMapOvr>
+    <a:masterClrMapping/>
+  </p:clrMapOvr>
+</p:notes>
+</file>
+
+<file path=ppt/notesSlides/notesSlide11.xml><?xml version="1.0" encoding="utf-8"?>
+<p:notes xmlns:a="http://schemas.openxmlformats.org/drawingml/2006/main" xmlns:r="http://schemas.openxmlformats.org/officeDocument/2006/relationships" xmlns:p="http://schemas.openxmlformats.org/presentationml/2006/main">
+  <p:cSld>
+    <p:spTree>
+      <p:nvGrpSpPr>
+        <p:cNvPr id="1" name=""/>
+        <p:cNvGrpSpPr/>
+        <p:nvPr/>
+      </p:nvGrpSpPr>
+      <p:grpSpPr>
+        <a:xfrm>
+          <a:off x="0" y="0"/>
+          <a:ext cx="0" cy="0"/>
+          <a:chOff x="0" y="0"/>
+          <a:chExt cx="0" cy="0"/>
+        </a:xfrm>
+      </p:grpSpPr>
+      <p:sp>
+        <p:nvSpPr>
+          <p:cNvPr id="2" name="Segnaposto immagine diapositiva 1"/>
+          <p:cNvSpPr>
+            <a:spLocks noGrp="1" noRot="1" noChangeAspect="1"/>
+          </p:cNvSpPr>
+          <p:nvPr>
+            <p:ph type="sldImg"/>
+          </p:nvPr>
+        </p:nvSpPr>
+        <p:spPr/>
+      </p:sp>
+      <p:sp>
+        <p:nvSpPr>
+          <p:cNvPr id="3" name="Segnaposto note 2"/>
+          <p:cNvSpPr>
+            <a:spLocks noGrp="1"/>
+          </p:cNvSpPr>
+          <p:nvPr>
+            <p:ph type="body" idx="1"/>
+          </p:nvPr>
+        </p:nvSpPr>
+        <p:spPr/>
+        <p:txBody>
+          <a:bodyPr/>
+          <a:lstStyle/>
+          <a:p>
+            <a:endParaRPr lang="it-IT"/>
+          </a:p>
+        </p:txBody>
+      </p:sp>
+      <p:sp>
+        <p:nvSpPr>
+          <p:cNvPr id="4" name="Segnaposto numero diapositiva 3"/>
+          <p:cNvSpPr>
+            <a:spLocks noGrp="1"/>
+          </p:cNvSpPr>
+          <p:nvPr>
+            <p:ph type="sldNum" sz="quarter" idx="10"/>
+          </p:nvPr>
+        </p:nvSpPr>
+        <p:spPr/>
+        <p:txBody>
+          <a:bodyPr/>
+          <a:lstStyle/>
+          <a:p>
+            <a:fld id="{CFA2E487-D896-4E0E-8AAE-B7DEF5C7D479}" type="slidenum">
+              <a:rPr lang="it-IT" smtClean="0"/>
+              <a:t>12</a:t>
+            </a:fld>
+            <a:endParaRPr lang="it-IT"/>
+          </a:p>
+        </p:txBody>
+      </p:sp>
+    </p:spTree>
+    <p:extLst>
+      <p:ext uri="{BB962C8B-B14F-4D97-AF65-F5344CB8AC3E}">
         <p14:creationId xmlns:p14="http://schemas.microsoft.com/office/powerpoint/2010/main" val="3844343771"/>
       </p:ext>
     </p:extLst>
@@ -1694,7 +1779,7 @@
           <a:p>
             <a:fld id="{B6E0B508-B881-48D4-821F-B26A9B79B3A3}" type="datetime1">
               <a:rPr lang="it-IT" smtClean="0"/>
-              <a:t>06/09/2015</a:t>
+              <a:t>09/09/2015</a:t>
             </a:fld>
             <a:endParaRPr lang="it-IT"/>
           </a:p>
@@ -1868,7 +1953,7 @@
           <a:p>
             <a:fld id="{545E7D00-0C8E-496B-868A-D9493DABF12A}" type="datetime1">
               <a:rPr lang="it-IT" smtClean="0"/>
-              <a:t>06/09/2015</a:t>
+              <a:t>09/09/2015</a:t>
             </a:fld>
             <a:endParaRPr lang="it-IT"/>
           </a:p>
@@ -2052,7 +2137,7 @@
           <a:p>
             <a:fld id="{342D94BC-23A3-46DD-9619-248029D1FE94}" type="datetime1">
               <a:rPr lang="it-IT" smtClean="0"/>
-              <a:t>06/09/2015</a:t>
+              <a:t>09/09/2015</a:t>
             </a:fld>
             <a:endParaRPr lang="it-IT"/>
           </a:p>
@@ -2226,7 +2311,7 @@
           <a:p>
             <a:fld id="{983F8A9F-C710-45FD-AB35-78C2F839272B}" type="datetime1">
               <a:rPr lang="it-IT" smtClean="0"/>
-              <a:t>06/09/2015</a:t>
+              <a:t>09/09/2015</a:t>
             </a:fld>
             <a:endParaRPr lang="it-IT"/>
           </a:p>
@@ -2476,7 +2561,7 @@
           <a:p>
             <a:fld id="{9B464FB8-12C8-4D66-8BC8-12E032A671B0}" type="datetime1">
               <a:rPr lang="it-IT" smtClean="0"/>
-              <a:t>06/09/2015</a:t>
+              <a:t>09/09/2015</a:t>
             </a:fld>
             <a:endParaRPr lang="it-IT"/>
           </a:p>
@@ -2712,7 +2797,7 @@
           <a:p>
             <a:fld id="{81A4ECBC-51E7-4B1D-AAB5-8994720AB72C}" type="datetime1">
               <a:rPr lang="it-IT" smtClean="0"/>
-              <a:t>06/09/2015</a:t>
+              <a:t>09/09/2015</a:t>
             </a:fld>
             <a:endParaRPr lang="it-IT"/>
           </a:p>
@@ -3083,7 +3168,7 @@
           <a:p>
             <a:fld id="{E56DF166-8581-411D-A5E4-5D293DDC1382}" type="datetime1">
               <a:rPr lang="it-IT" smtClean="0"/>
-              <a:t>06/09/2015</a:t>
+              <a:t>09/09/2015</a:t>
             </a:fld>
             <a:endParaRPr lang="it-IT"/>
           </a:p>
@@ -3205,7 +3290,7 @@
           <a:p>
             <a:fld id="{BC186AF0-FDBB-4A9A-A1FA-DAE9933BF9AF}" type="datetime1">
               <a:rPr lang="it-IT" smtClean="0"/>
-              <a:t>06/09/2015</a:t>
+              <a:t>09/09/2015</a:t>
             </a:fld>
             <a:endParaRPr lang="it-IT"/>
           </a:p>
@@ -3304,7 +3389,7 @@
           <a:p>
             <a:fld id="{DD35B7E5-4546-4F7B-BEE8-CB19004121FB}" type="datetime1">
               <a:rPr lang="it-IT" smtClean="0"/>
-              <a:t>06/09/2015</a:t>
+              <a:t>09/09/2015</a:t>
             </a:fld>
             <a:endParaRPr lang="it-IT"/>
           </a:p>
@@ -3585,7 +3670,7 @@
           <a:p>
             <a:fld id="{50A02FB4-091F-4DFA-BF35-ED3D039280B7}" type="datetime1">
               <a:rPr lang="it-IT" smtClean="0"/>
-              <a:t>06/09/2015</a:t>
+              <a:t>09/09/2015</a:t>
             </a:fld>
             <a:endParaRPr lang="it-IT"/>
           </a:p>
@@ -3842,7 +3927,7 @@
           <a:p>
             <a:fld id="{5C6E9F36-295A-42C0-BFD2-99935AC5EFFF}" type="datetime1">
               <a:rPr lang="it-IT" smtClean="0"/>
-              <a:t>06/09/2015</a:t>
+              <a:t>09/09/2015</a:t>
             </a:fld>
             <a:endParaRPr lang="it-IT"/>
           </a:p>
@@ -4059,7 +4144,7 @@
           <a:p>
             <a:fld id="{8E2F48DD-6D73-4E6A-8EC2-7153CF7C39F2}" type="datetime1">
               <a:rPr lang="it-IT" smtClean="0"/>
-              <a:t>06/09/2015</a:t>
+              <a:t>09/09/2015</a:t>
             </a:fld>
             <a:endParaRPr lang="it-IT"/>
           </a:p>
@@ -5310,7 +5395,7 @@
                   <a:srgbClr val="044F92"/>
                 </a:solidFill>
               </a:rPr>
-              <a:t>CONCLUSIONI</a:t>
+              <a:t>DATI</a:t>
             </a:r>
             <a:endParaRPr lang="it-IT" sz="4400" dirty="0">
               <a:solidFill>
@@ -5341,31 +5426,323 @@
           </a:bodyPr>
           <a:lstStyle/>
           <a:p>
+            <a:r>
+              <a:rPr lang="it-IT" sz="2400" dirty="0">
+                <a:latin typeface="Cambria" panose="02040503050406030204" pitchFamily="18" charset="0"/>
+              </a:rPr>
+              <a:t> </a:t>
+            </a:r>
+            <a:r>
+              <a:rPr lang="it-IT" sz="2400" dirty="0" smtClean="0">
+                <a:latin typeface="Cambria" panose="02040503050406030204" pitchFamily="18" charset="0"/>
+              </a:rPr>
+              <a:t>dati </a:t>
+            </a:r>
+            <a:r>
+              <a:rPr lang="it-IT" sz="2400" dirty="0" err="1" smtClean="0">
+                <a:latin typeface="Cambria" panose="02040503050406030204" pitchFamily="18" charset="0"/>
+              </a:rPr>
+              <a:t>app</a:t>
+            </a:r>
+            <a:endParaRPr lang="it-IT" sz="2400" dirty="0" smtClean="0">
+              <a:latin typeface="Cambria" panose="02040503050406030204" pitchFamily="18" charset="0"/>
+            </a:endParaRPr>
+          </a:p>
+          <a:p>
+            <a:r>
+              <a:rPr lang="it-IT" sz="2400" dirty="0" smtClean="0">
+                <a:latin typeface="Cambria" panose="02040503050406030204" pitchFamily="18" charset="0"/>
+              </a:rPr>
+              <a:t>Numero download</a:t>
+            </a:r>
+          </a:p>
+          <a:p>
+            <a:r>
+              <a:rPr lang="it-IT" sz="2400" dirty="0" err="1" smtClean="0">
+                <a:latin typeface="Cambria" panose="02040503050406030204" pitchFamily="18" charset="0"/>
+              </a:rPr>
+              <a:t>Crashlitics</a:t>
+            </a:r>
+            <a:endParaRPr lang="it-IT" sz="2400" dirty="0" smtClean="0">
+              <a:latin typeface="Cambria" panose="02040503050406030204" pitchFamily="18" charset="0"/>
+            </a:endParaRPr>
+          </a:p>
+          <a:p>
+            <a:r>
+              <a:rPr lang="it-IT" sz="2400" smtClean="0">
+                <a:latin typeface="Cambria" panose="02040503050406030204" pitchFamily="18" charset="0"/>
+              </a:rPr>
+              <a:t>Dati gioco</a:t>
+            </a:r>
+            <a:endParaRPr lang="it-IT" sz="2400" dirty="0" smtClean="0">
+              <a:latin typeface="Cambria" panose="02040503050406030204" pitchFamily="18" charset="0"/>
+            </a:endParaRPr>
+          </a:p>
+          <a:p>
             <a:pPr marL="342900" indent="-342900">
               <a:buFont typeface="Arial" panose="020B0604020202020204" pitchFamily="34" charset="0"/>
               <a:buChar char="•"/>
             </a:pPr>
-            <a:r>
-              <a:rPr lang="it-IT" sz="2400" dirty="0" smtClean="0">
+            <a:endParaRPr lang="it-IT" sz="2400" dirty="0">
+              <a:latin typeface="Cambria" panose="02040503050406030204" pitchFamily="18" charset="0"/>
+            </a:endParaRPr>
+          </a:p>
+        </p:txBody>
+      </p:sp>
+    </p:spTree>
+    <p:extLst>
+      <p:ext uri="{BB962C8B-B14F-4D97-AF65-F5344CB8AC3E}">
+        <p14:creationId xmlns:p14="http://schemas.microsoft.com/office/powerpoint/2010/main" val="2463686729"/>
+      </p:ext>
+    </p:extLst>
+  </p:cSld>
+  <p:clrMapOvr>
+    <a:masterClrMapping/>
+  </p:clrMapOvr>
+  <p:timing>
+    <p:tnLst>
+      <p:par>
+        <p:cTn id="1" dur="indefinite" restart="never" nodeType="tmRoot"/>
+      </p:par>
+    </p:tnLst>
+  </p:timing>
+</p:sld>
+</file>
+
+<file path=ppt/slides/slide12.xml><?xml version="1.0" encoding="utf-8"?>
+<p:sld xmlns:a="http://schemas.openxmlformats.org/drawingml/2006/main" xmlns:r="http://schemas.openxmlformats.org/officeDocument/2006/relationships" xmlns:p="http://schemas.openxmlformats.org/presentationml/2006/main">
+  <p:cSld>
+    <p:spTree>
+      <p:nvGrpSpPr>
+        <p:cNvPr id="1" name=""/>
+        <p:cNvGrpSpPr/>
+        <p:nvPr/>
+      </p:nvGrpSpPr>
+      <p:grpSpPr>
+        <a:xfrm>
+          <a:off x="0" y="0"/>
+          <a:ext cx="0" cy="0"/>
+          <a:chOff x="0" y="0"/>
+          <a:chExt cx="0" cy="0"/>
+        </a:xfrm>
+      </p:grpSpPr>
+      <p:cxnSp>
+        <p:nvCxnSpPr>
+          <p:cNvPr id="3" name="Connettore 1 2"/>
+          <p:cNvCxnSpPr/>
+          <p:nvPr/>
+        </p:nvCxnSpPr>
+        <p:spPr>
+          <a:xfrm>
+            <a:off x="0" y="1104405"/>
+            <a:ext cx="12192000" cy="0"/>
+          </a:xfrm>
+          <a:prstGeom prst="line">
+            <a:avLst/>
+          </a:prstGeom>
+          <a:ln>
+            <a:solidFill>
+              <a:srgbClr val="044F92"/>
+            </a:solidFill>
+          </a:ln>
+        </p:spPr>
+        <p:style>
+          <a:lnRef idx="1">
+            <a:schemeClr val="accent1"/>
+          </a:lnRef>
+          <a:fillRef idx="0">
+            <a:schemeClr val="accent1"/>
+          </a:fillRef>
+          <a:effectRef idx="0">
+            <a:schemeClr val="accent1"/>
+          </a:effectRef>
+          <a:fontRef idx="minor">
+            <a:schemeClr val="tx1"/>
+          </a:fontRef>
+        </p:style>
+      </p:cxnSp>
+      <p:sp>
+        <p:nvSpPr>
+          <p:cNvPr id="5" name="Rettangolo 4"/>
+          <p:cNvSpPr/>
+          <p:nvPr/>
+        </p:nvSpPr>
+        <p:spPr>
+          <a:xfrm>
+            <a:off x="0" y="6258296"/>
+            <a:ext cx="12192000" cy="599704"/>
+          </a:xfrm>
+          <a:prstGeom prst="rect">
+            <a:avLst/>
+          </a:prstGeom>
+          <a:solidFill>
+            <a:srgbClr val="044F92"/>
+          </a:solidFill>
+        </p:spPr>
+        <p:style>
+          <a:lnRef idx="2">
+            <a:schemeClr val="accent1">
+              <a:shade val="50000"/>
+            </a:schemeClr>
+          </a:lnRef>
+          <a:fillRef idx="1">
+            <a:schemeClr val="accent1"/>
+          </a:fillRef>
+          <a:effectRef idx="0">
+            <a:schemeClr val="accent1"/>
+          </a:effectRef>
+          <a:fontRef idx="minor">
+            <a:schemeClr val="lt1"/>
+          </a:fontRef>
+        </p:style>
+        <p:txBody>
+          <a:bodyPr rtlCol="0" anchor="ctr"/>
+          <a:lstStyle/>
+          <a:p>
+            <a:pPr algn="ctr"/>
+            <a:endParaRPr lang="it-IT" dirty="0"/>
+          </a:p>
+        </p:txBody>
+      </p:sp>
+      <p:sp>
+        <p:nvSpPr>
+          <p:cNvPr id="6" name="CasellaDiTesto 5"/>
+          <p:cNvSpPr txBox="1"/>
+          <p:nvPr/>
+        </p:nvSpPr>
+        <p:spPr>
+          <a:xfrm>
+            <a:off x="166254" y="6373482"/>
+            <a:ext cx="2175596" cy="369332"/>
+          </a:xfrm>
+          <a:prstGeom prst="rect">
+            <a:avLst/>
+          </a:prstGeom>
+          <a:noFill/>
+        </p:spPr>
+        <p:txBody>
+          <a:bodyPr wrap="none" rtlCol="0">
+            <a:spAutoFit/>
+          </a:bodyPr>
+          <a:lstStyle/>
+          <a:p>
+            <a:r>
+              <a:rPr lang="it-IT" dirty="0" smtClean="0">
+                <a:solidFill>
+                  <a:schemeClr val="bg1"/>
+                </a:solidFill>
                 <a:latin typeface="Cambria" panose="02040503050406030204" pitchFamily="18" charset="0"/>
               </a:rPr>
-              <a:t>Prima parte conclusioni</a:t>
-            </a:r>
-          </a:p>
+              <a:t>Scuola di Ingegneria</a:t>
+            </a:r>
+            <a:endParaRPr lang="it-IT" dirty="0">
+              <a:solidFill>
+                <a:schemeClr val="bg1"/>
+              </a:solidFill>
+              <a:latin typeface="Cambria" panose="02040503050406030204" pitchFamily="18" charset="0"/>
+            </a:endParaRPr>
+          </a:p>
+        </p:txBody>
+      </p:sp>
+      <p:pic>
+        <p:nvPicPr>
+          <p:cNvPr id="8" name="Immagine 7"/>
+          <p:cNvPicPr>
+            <a:picLocks noChangeAspect="1"/>
+          </p:cNvPicPr>
+          <p:nvPr/>
+        </p:nvPicPr>
+        <p:blipFill>
+          <a:blip r:embed="rId3" cstate="print">
+            <a:extLst>
+              <a:ext uri="{28A0092B-C50C-407E-A947-70E740481C1C}">
+                <a14:useLocalDpi xmlns:a14="http://schemas.microsoft.com/office/drawing/2010/main" val="0"/>
+              </a:ext>
+            </a:extLst>
+          </a:blip>
+          <a:stretch>
+            <a:fillRect/>
+          </a:stretch>
+        </p:blipFill>
+        <p:spPr>
+          <a:xfrm>
+            <a:off x="10456038" y="6317671"/>
+            <a:ext cx="1450189" cy="484518"/>
+          </a:xfrm>
+          <a:prstGeom prst="rect">
+            <a:avLst/>
+          </a:prstGeom>
+        </p:spPr>
+      </p:pic>
+      <p:sp>
+        <p:nvSpPr>
+          <p:cNvPr id="9" name="CasellaDiTesto 8"/>
+          <p:cNvSpPr txBox="1"/>
+          <p:nvPr/>
+        </p:nvSpPr>
+        <p:spPr>
+          <a:xfrm>
+            <a:off x="285007" y="190005"/>
+            <a:ext cx="7956468" cy="769441"/>
+          </a:xfrm>
+          <a:prstGeom prst="rect">
+            <a:avLst/>
+          </a:prstGeom>
+          <a:noFill/>
+        </p:spPr>
+        <p:txBody>
+          <a:bodyPr wrap="square" rtlCol="0">
+            <a:spAutoFit/>
+          </a:bodyPr>
+          <a:lstStyle/>
+          <a:p>
+            <a:r>
+              <a:rPr lang="it-IT" sz="4400" dirty="0" smtClean="0">
+                <a:solidFill>
+                  <a:srgbClr val="044F92"/>
+                </a:solidFill>
+              </a:rPr>
+              <a:t>CONCLUSIONI</a:t>
+            </a:r>
+            <a:endParaRPr lang="it-IT" sz="4400" dirty="0">
+              <a:solidFill>
+                <a:srgbClr val="044F92"/>
+              </a:solidFill>
+            </a:endParaRPr>
+          </a:p>
+        </p:txBody>
+      </p:sp>
+      <p:sp>
+        <p:nvSpPr>
+          <p:cNvPr id="10" name="Rettangolo 9"/>
+          <p:cNvSpPr/>
+          <p:nvPr/>
+        </p:nvSpPr>
+        <p:spPr>
+          <a:xfrm>
+            <a:off x="285007" y="1609981"/>
+            <a:ext cx="8847118" cy="2677656"/>
+          </a:xfrm>
+          <a:prstGeom prst="rect">
+            <a:avLst/>
+          </a:prstGeom>
+        </p:spPr>
+        <p:txBody>
+          <a:bodyPr wrap="square">
+            <a:spAutoFit/>
+          </a:bodyPr>
+          <a:lstStyle/>
           <a:p>
             <a:pPr marL="342900" indent="-342900">
               <a:buFont typeface="Arial" panose="020B0604020202020204" pitchFamily="34" charset="0"/>
               <a:buChar char="•"/>
             </a:pPr>
             <a:r>
-              <a:rPr lang="it-IT" sz="2400" dirty="0" err="1" smtClean="0">
+              <a:rPr lang="it-IT" sz="2400" dirty="0" smtClean="0">
                 <a:latin typeface="Cambria" panose="02040503050406030204" pitchFamily="18" charset="0"/>
               </a:rPr>
-              <a:t>Paper</a:t>
-            </a:r>
-            <a:endParaRPr lang="it-IT" sz="2400" dirty="0" smtClean="0">
-              <a:latin typeface="Cambria" panose="02040503050406030204" pitchFamily="18" charset="0"/>
-            </a:endParaRPr>
+              <a:t>Prima parte conclusioni</a:t>
+            </a:r>
           </a:p>
           <a:p>
             <a:pPr marL="342900" indent="-342900">
@@ -5373,11 +5750,14 @@
               <a:buChar char="•"/>
             </a:pPr>
             <a:r>
-              <a:rPr lang="it-IT" sz="2400" dirty="0" smtClean="0">
+              <a:rPr lang="it-IT" sz="2400" dirty="0" err="1" smtClean="0">
                 <a:latin typeface="Cambria" panose="02040503050406030204" pitchFamily="18" charset="0"/>
               </a:rPr>
-              <a:t>Sviluppi futuri</a:t>
-            </a:r>
+              <a:t>Paper</a:t>
+            </a:r>
+            <a:endParaRPr lang="it-IT" sz="2400" dirty="0" smtClean="0">
+              <a:latin typeface="Cambria" panose="02040503050406030204" pitchFamily="18" charset="0"/>
+            </a:endParaRPr>
           </a:p>
           <a:p>
             <a:pPr marL="342900" indent="-342900">
@@ -5388,7 +5768,7 @@
               <a:rPr lang="it-IT" sz="2400" dirty="0" smtClean="0">
                 <a:latin typeface="Cambria" panose="02040503050406030204" pitchFamily="18" charset="0"/>
               </a:rPr>
-              <a:t>????? I dati che abbiamo raccolto????</a:t>
+              <a:t>Sviluppi futuri</a:t>
             </a:r>
           </a:p>
           <a:p>
@@ -5396,6 +5776,38 @@
               <a:buFont typeface="Arial" panose="020B0604020202020204" pitchFamily="34" charset="0"/>
               <a:buChar char="•"/>
             </a:pPr>
+            <a:r>
+              <a:rPr lang="it-IT" sz="2400" dirty="0" smtClean="0">
+                <a:latin typeface="Cambria" panose="02040503050406030204" pitchFamily="18" charset="0"/>
+              </a:rPr>
+              <a:t>????? I dati che abbiamo raccolto????</a:t>
+            </a:r>
+          </a:p>
+          <a:p>
+            <a:pPr marL="342900" indent="-342900">
+              <a:buFont typeface="Arial" panose="020B0604020202020204" pitchFamily="34" charset="0"/>
+              <a:buChar char="•"/>
+            </a:pPr>
+            <a:endParaRPr lang="it-IT" sz="2400" dirty="0" smtClean="0">
+              <a:latin typeface="Cambria" panose="02040503050406030204" pitchFamily="18" charset="0"/>
+            </a:endParaRPr>
+          </a:p>
+          <a:p>
+            <a:pPr marL="342900" indent="-342900">
+              <a:buFont typeface="Arial" panose="020B0604020202020204" pitchFamily="34" charset="0"/>
+              <a:buChar char="•"/>
+            </a:pPr>
+            <a:endParaRPr lang="it-IT" sz="2400" dirty="0">
+              <a:latin typeface="Cambria" panose="02040503050406030204" pitchFamily="18" charset="0"/>
+            </a:endParaRPr>
+          </a:p>
+          <a:p>
+            <a:r>
+              <a:rPr lang="it-IT" sz="2400" dirty="0" smtClean="0">
+                <a:latin typeface="Cambria" panose="02040503050406030204" pitchFamily="18" charset="0"/>
+              </a:rPr>
+              <a:t>Tempo 25 minuti</a:t>
+            </a:r>
             <a:endParaRPr lang="it-IT" sz="2400" dirty="0">
               <a:latin typeface="Cambria" panose="02040503050406030204" pitchFamily="18" charset="0"/>
             </a:endParaRPr>
@@ -6332,9 +6744,6 @@
               </a:rPr>
               <a:t>più ampio.</a:t>
             </a:r>
-            <a:endParaRPr lang="it-IT" sz="2400" dirty="0">
-              <a:latin typeface="Cambria" panose="02040503050406030204" pitchFamily="18" charset="0"/>
-            </a:endParaRPr>
           </a:p>
         </p:txBody>
       </p:sp>
@@ -8286,7 +8695,7 @@
   <a:extraClrSchemeLst/>
   <a:extLst>
     <a:ext uri="{05A4C25C-085E-4340-85A3-A5531E510DB2}">
-      <thm15:themeFamily xmlns:thm15="http://schemas.microsoft.com/office/thememl/2012/main" name="Office Theme" id="{62F939B6-93AF-4DB8-9C6B-D6C7DFDC589F}" vid="{4A3C46E8-61CC-4603-A589-7422A47A8E4A}"/>
+      <thm15:themeFamily xmlns:thm15="http://schemas.microsoft.com/office/thememl/2012/main" xmlns="" name="Office Theme" id="{62F939B6-93AF-4DB8-9C6B-D6C7DFDC589F}" vid="{4A3C46E8-61CC-4603-A589-7422A47A8E4A}"/>
     </a:ext>
   </a:extLst>
 </a:theme>
@@ -8547,7 +8956,7 @@
   <a:extraClrSchemeLst/>
   <a:extLst>
     <a:ext uri="{05A4C25C-085E-4340-85A3-A5531E510DB2}">
-      <thm15:themeFamily xmlns:thm15="http://schemas.microsoft.com/office/thememl/2012/main" name="Office Theme" id="{62F939B6-93AF-4DB8-9C6B-D6C7DFDC589F}" vid="{4A3C46E8-61CC-4603-A589-7422A47A8E4A}"/>
+      <thm15:themeFamily xmlns:thm15="http://schemas.microsoft.com/office/thememl/2012/main" xmlns="" name="Office Theme" id="{62F939B6-93AF-4DB8-9C6B-D6C7DFDC589F}" vid="{4A3C46E8-61CC-4603-A589-7422A47A8E4A}"/>
     </a:ext>
   </a:extLst>
 </a:theme>

</xml_diff>